<commit_message>
added slides for activation and learning rate
</commit_message>
<xml_diff>
--- a/Introduction-to-Artificial-Neural-Networks.pptx
+++ b/Introduction-to-Artificial-Neural-Networks.pptx
@@ -5,17 +5,19 @@
     <p:sldMasterId id="2147483648" r:id="rId1"/>
   </p:sldMasterIdLst>
   <p:notesMasterIdLst>
-    <p:notesMasterId r:id="rId10"/>
+    <p:notesMasterId r:id="rId12"/>
   </p:notesMasterIdLst>
   <p:sldIdLst>
     <p:sldId id="256" r:id="rId2"/>
     <p:sldId id="257" r:id="rId3"/>
     <p:sldId id="263" r:id="rId4"/>
     <p:sldId id="264" r:id="rId5"/>
-    <p:sldId id="258" r:id="rId6"/>
-    <p:sldId id="260" r:id="rId7"/>
-    <p:sldId id="261" r:id="rId8"/>
-    <p:sldId id="262" r:id="rId9"/>
+    <p:sldId id="265" r:id="rId6"/>
+    <p:sldId id="266" r:id="rId7"/>
+    <p:sldId id="258" r:id="rId8"/>
+    <p:sldId id="260" r:id="rId9"/>
+    <p:sldId id="261" r:id="rId10"/>
+    <p:sldId id="262" r:id="rId11"/>
   </p:sldIdLst>
   <p:sldSz cx="14630400" cy="8229600"/>
   <p:notesSz cx="8229600" cy="14630400"/>
@@ -120,6 +122,8 @@
             <p14:sldId id="257"/>
             <p14:sldId id="263"/>
             <p14:sldId id="264"/>
+            <p14:sldId id="265"/>
+            <p14:sldId id="266"/>
             <p14:sldId id="258"/>
             <p14:sldId id="260"/>
             <p14:sldId id="261"/>
@@ -596,7 +600,7 @@
           <a:p>
             <a:fld id="{F7021451-1387-4CA6-816F-3879F97B5CBC}" type="slidenum">
               <a:rPr lang="en-US"/>
-              <a:t>5</a:t>
+              <a:t>7</a:t>
             </a:fld>
             <a:endParaRPr lang="en-US"/>
           </a:p>
@@ -680,7 +684,7 @@
           <a:p>
             <a:fld id="{F7021451-1387-4CA6-816F-3879F97B5CBC}" type="slidenum">
               <a:rPr lang="en-US"/>
-              <a:t>6</a:t>
+              <a:t>8</a:t>
             </a:fld>
             <a:endParaRPr lang="en-US"/>
           </a:p>
@@ -764,7 +768,7 @@
           <a:p>
             <a:fld id="{F7021451-1387-4CA6-816F-3879F97B5CBC}" type="slidenum">
               <a:rPr lang="en-US"/>
-              <a:t>7</a:t>
+              <a:t>9</a:t>
             </a:fld>
             <a:endParaRPr lang="en-US"/>
           </a:p>
@@ -848,7 +852,7 @@
           <a:p>
             <a:fld id="{F7021451-1387-4CA6-816F-3879F97B5CBC}" type="slidenum">
               <a:rPr lang="en-US"/>
-              <a:t>8</a:t>
+              <a:t>10</a:t>
             </a:fld>
             <a:endParaRPr lang="en-US"/>
           </a:p>
@@ -1599,6 +1603,609 @@
 </p:sld>
 </file>
 
+<file path=ppt/slides/slide10.xml><?xml version="1.0" encoding="utf-8"?>
+<p:sld xmlns:a="http://schemas.openxmlformats.org/drawingml/2006/main" xmlns:r="http://schemas.openxmlformats.org/officeDocument/2006/relationships" xmlns:p="http://schemas.openxmlformats.org/presentationml/2006/main">
+  <p:cSld name="Slide 7">
+    <p:spTree>
+      <p:nvGrpSpPr>
+        <p:cNvPr id="1" name=""/>
+        <p:cNvGrpSpPr/>
+        <p:nvPr/>
+      </p:nvGrpSpPr>
+      <p:grpSpPr>
+        <a:xfrm>
+          <a:off x="0" y="0"/>
+          <a:ext cx="0" cy="0"/>
+          <a:chOff x="0" y="0"/>
+          <a:chExt cx="0" cy="0"/>
+        </a:xfrm>
+      </p:grpSpPr>
+      <p:pic>
+        <p:nvPicPr>
+          <p:cNvPr id="2" name="Image 0" descr="preencoded.png"/>
+          <p:cNvPicPr>
+            <a:picLocks noChangeAspect="1"/>
+          </p:cNvPicPr>
+          <p:nvPr/>
+        </p:nvPicPr>
+        <p:blipFill>
+          <a:blip r:embed="rId3"/>
+          <a:stretch>
+            <a:fillRect/>
+          </a:stretch>
+        </p:blipFill>
+        <p:spPr>
+          <a:xfrm>
+            <a:off x="0" y="0"/>
+            <a:ext cx="14630400" cy="8229600"/>
+          </a:xfrm>
+          <a:prstGeom prst="rect">
+            <a:avLst/>
+          </a:prstGeom>
+        </p:spPr>
+      </p:pic>
+      <p:sp>
+        <p:nvSpPr>
+          <p:cNvPr id="3" name="Shape 0"/>
+          <p:cNvSpPr/>
+          <p:nvPr/>
+        </p:nvSpPr>
+        <p:spPr>
+          <a:xfrm>
+            <a:off x="0" y="0"/>
+            <a:ext cx="14630400" cy="8229600"/>
+          </a:xfrm>
+          <a:prstGeom prst="rect">
+            <a:avLst/>
+          </a:prstGeom>
+          <a:solidFill>
+            <a:srgbClr val="FFFFFF">
+              <a:alpha val="75000"/>
+            </a:srgbClr>
+          </a:solidFill>
+          <a:ln w="7620">
+            <a:solidFill>
+              <a:srgbClr val="FFFFFF">
+                <a:alpha val="64000"/>
+              </a:srgbClr>
+            </a:solidFill>
+            <a:prstDash val="solid"/>
+          </a:ln>
+        </p:spPr>
+      </p:sp>
+      <p:sp>
+        <p:nvSpPr>
+          <p:cNvPr id="4" name="Text 1"/>
+          <p:cNvSpPr/>
+          <p:nvPr/>
+        </p:nvSpPr>
+        <p:spPr>
+          <a:xfrm>
+            <a:off x="6319599" y="910352"/>
+            <a:ext cx="4443889" cy="722114"/>
+          </a:xfrm>
+          <a:prstGeom prst="rect">
+            <a:avLst/>
+          </a:prstGeom>
+          <a:noFill/>
+          <a:ln/>
+        </p:spPr>
+        <p:txBody>
+          <a:bodyPr wrap="none" rtlCol="0" anchor="t"/>
+          <a:lstStyle/>
+          <a:p>
+            <a:pPr marL="0" indent="0">
+              <a:lnSpc>
+                <a:spcPts val="5686"/>
+              </a:lnSpc>
+              <a:buNone/>
+            </a:pPr>
+            <a:r>
+              <a:rPr lang="en-US" sz="4374" dirty="0">
+                <a:solidFill>
+                  <a:srgbClr val="312F2B"/>
+                </a:solidFill>
+                <a:latin typeface="Georgia" pitchFamily="34" charset="0"/>
+                <a:ea typeface="Georgia" pitchFamily="34" charset="-122"/>
+                <a:cs typeface="Georgia" pitchFamily="34" charset="-120"/>
+              </a:rPr>
+              <a:t>Conclusion</a:t>
+            </a:r>
+            <a:endParaRPr lang="en-US" sz="4374" dirty="0"/>
+          </a:p>
+        </p:txBody>
+      </p:sp>
+      <p:sp>
+        <p:nvSpPr>
+          <p:cNvPr id="5" name="Shape 2"/>
+          <p:cNvSpPr/>
+          <p:nvPr/>
+        </p:nvSpPr>
+        <p:spPr>
+          <a:xfrm>
+            <a:off x="6319599" y="2118479"/>
+            <a:ext cx="499943" cy="499943"/>
+          </a:xfrm>
+          <a:prstGeom prst="roundRect">
+            <a:avLst>
+              <a:gd name="adj" fmla="val 10974"/>
+            </a:avLst>
+          </a:prstGeom>
+          <a:solidFill>
+            <a:srgbClr val="E8E8E3"/>
+          </a:solidFill>
+          <a:ln w="7620">
+            <a:solidFill>
+              <a:srgbClr val="D1D1C7"/>
+            </a:solidFill>
+            <a:prstDash val="solid"/>
+          </a:ln>
+        </p:spPr>
+      </p:sp>
+      <p:sp>
+        <p:nvSpPr>
+          <p:cNvPr id="6" name="Text 3"/>
+          <p:cNvSpPr/>
+          <p:nvPr/>
+        </p:nvSpPr>
+        <p:spPr>
+          <a:xfrm>
+            <a:off x="6478072" y="2151817"/>
+            <a:ext cx="182880" cy="433149"/>
+          </a:xfrm>
+          <a:prstGeom prst="rect">
+            <a:avLst/>
+          </a:prstGeom>
+          <a:noFill/>
+          <a:ln/>
+        </p:spPr>
+        <p:txBody>
+          <a:bodyPr wrap="none" rtlCol="0" anchor="t"/>
+          <a:lstStyle/>
+          <a:p>
+            <a:pPr marL="0" indent="0" algn="ctr">
+              <a:lnSpc>
+                <a:spcPts val="3412"/>
+              </a:lnSpc>
+              <a:buNone/>
+            </a:pPr>
+            <a:r>
+              <a:rPr lang="en-US" sz="2624" dirty="0">
+                <a:solidFill>
+                  <a:srgbClr val="272525"/>
+                </a:solidFill>
+                <a:latin typeface="Georgia" pitchFamily="34" charset="0"/>
+                <a:ea typeface="Georgia" pitchFamily="34" charset="-122"/>
+                <a:cs typeface="Georgia" pitchFamily="34" charset="-120"/>
+              </a:rPr>
+              <a:t>1</a:t>
+            </a:r>
+            <a:endParaRPr lang="en-US" sz="2624" dirty="0"/>
+          </a:p>
+        </p:txBody>
+      </p:sp>
+      <p:sp>
+        <p:nvSpPr>
+          <p:cNvPr id="7" name="Text 4"/>
+          <p:cNvSpPr/>
+          <p:nvPr/>
+        </p:nvSpPr>
+        <p:spPr>
+          <a:xfrm>
+            <a:off x="7041713" y="2187893"/>
+            <a:ext cx="2905601" cy="1082993"/>
+          </a:xfrm>
+          <a:prstGeom prst="rect">
+            <a:avLst/>
+          </a:prstGeom>
+          <a:noFill/>
+          <a:ln/>
+        </p:spPr>
+        <p:txBody>
+          <a:bodyPr wrap="square" rtlCol="0" anchor="t"/>
+          <a:lstStyle/>
+          <a:p>
+            <a:pPr marL="0" indent="0">
+              <a:lnSpc>
+                <a:spcPts val="2843"/>
+              </a:lnSpc>
+              <a:buNone/>
+            </a:pPr>
+            <a:r>
+              <a:rPr lang="en-US" sz="2187" dirty="0">
+                <a:solidFill>
+                  <a:srgbClr val="272525"/>
+                </a:solidFill>
+                <a:latin typeface="Georgia" pitchFamily="34" charset="0"/>
+                <a:ea typeface="Georgia" pitchFamily="34" charset="-122"/>
+                <a:cs typeface="Georgia" pitchFamily="34" charset="-120"/>
+              </a:rPr>
+              <a:t>ANNs are powerful machine learning tools</a:t>
+            </a:r>
+            <a:endParaRPr lang="en-US" sz="2187" dirty="0"/>
+          </a:p>
+        </p:txBody>
+      </p:sp>
+      <p:sp>
+        <p:nvSpPr>
+          <p:cNvPr id="8" name="Text 5"/>
+          <p:cNvSpPr/>
+          <p:nvPr/>
+        </p:nvSpPr>
+        <p:spPr>
+          <a:xfrm>
+            <a:off x="7041713" y="3493056"/>
+            <a:ext cx="2905601" cy="1599248"/>
+          </a:xfrm>
+          <a:prstGeom prst="rect">
+            <a:avLst/>
+          </a:prstGeom>
+          <a:noFill/>
+          <a:ln/>
+        </p:spPr>
+        <p:txBody>
+          <a:bodyPr wrap="square" rtlCol="0" anchor="t"/>
+          <a:lstStyle/>
+          <a:p>
+            <a:pPr marL="0" indent="0">
+              <a:lnSpc>
+                <a:spcPts val="3149"/>
+              </a:lnSpc>
+              <a:buNone/>
+            </a:pPr>
+            <a:r>
+              <a:rPr lang="en-US" sz="1750" dirty="0">
+                <a:solidFill>
+                  <a:srgbClr val="272525"/>
+                </a:solidFill>
+                <a:latin typeface="Lato" pitchFamily="34" charset="0"/>
+                <a:ea typeface="Lato" pitchFamily="34" charset="-122"/>
+                <a:cs typeface="Lato" pitchFamily="34" charset="-120"/>
+              </a:rPr>
+              <a:t>They're inspired by the human brain and can learn complex patterns from data to make predictions.</a:t>
+            </a:r>
+            <a:endParaRPr lang="en-US" sz="1750" dirty="0"/>
+          </a:p>
+        </p:txBody>
+      </p:sp>
+      <p:sp>
+        <p:nvSpPr>
+          <p:cNvPr id="9" name="Shape 6"/>
+          <p:cNvSpPr/>
+          <p:nvPr/>
+        </p:nvSpPr>
+        <p:spPr>
+          <a:xfrm>
+            <a:off x="10169485" y="2118479"/>
+            <a:ext cx="499943" cy="499943"/>
+          </a:xfrm>
+          <a:prstGeom prst="roundRect">
+            <a:avLst>
+              <a:gd name="adj" fmla="val 10974"/>
+            </a:avLst>
+          </a:prstGeom>
+          <a:solidFill>
+            <a:srgbClr val="E8E8E3"/>
+          </a:solidFill>
+          <a:ln w="7620">
+            <a:solidFill>
+              <a:srgbClr val="D1D1C7"/>
+            </a:solidFill>
+            <a:prstDash val="solid"/>
+          </a:ln>
+        </p:spPr>
+      </p:sp>
+      <p:sp>
+        <p:nvSpPr>
+          <p:cNvPr id="10" name="Text 7"/>
+          <p:cNvSpPr/>
+          <p:nvPr/>
+        </p:nvSpPr>
+        <p:spPr>
+          <a:xfrm>
+            <a:off x="10327958" y="2151817"/>
+            <a:ext cx="182880" cy="433149"/>
+          </a:xfrm>
+          <a:prstGeom prst="rect">
+            <a:avLst/>
+          </a:prstGeom>
+          <a:noFill/>
+          <a:ln/>
+        </p:spPr>
+        <p:txBody>
+          <a:bodyPr wrap="none" rtlCol="0" anchor="t"/>
+          <a:lstStyle/>
+          <a:p>
+            <a:pPr marL="0" indent="0" algn="ctr">
+              <a:lnSpc>
+                <a:spcPts val="3412"/>
+              </a:lnSpc>
+              <a:buNone/>
+            </a:pPr>
+            <a:r>
+              <a:rPr lang="en-US" sz="2624" dirty="0">
+                <a:solidFill>
+                  <a:srgbClr val="272525"/>
+                </a:solidFill>
+                <a:latin typeface="Georgia" pitchFamily="34" charset="0"/>
+                <a:ea typeface="Georgia" pitchFamily="34" charset="-122"/>
+                <a:cs typeface="Georgia" pitchFamily="34" charset="-120"/>
+              </a:rPr>
+              <a:t>2</a:t>
+            </a:r>
+            <a:endParaRPr lang="en-US" sz="2624" dirty="0"/>
+          </a:p>
+        </p:txBody>
+      </p:sp>
+      <p:sp>
+        <p:nvSpPr>
+          <p:cNvPr id="11" name="Text 8"/>
+          <p:cNvSpPr/>
+          <p:nvPr/>
+        </p:nvSpPr>
+        <p:spPr>
+          <a:xfrm>
+            <a:off x="10891599" y="2187893"/>
+            <a:ext cx="2905601" cy="721995"/>
+          </a:xfrm>
+          <a:prstGeom prst="rect">
+            <a:avLst/>
+          </a:prstGeom>
+          <a:noFill/>
+          <a:ln/>
+        </p:spPr>
+        <p:txBody>
+          <a:bodyPr wrap="square" rtlCol="0" anchor="t"/>
+          <a:lstStyle/>
+          <a:p>
+            <a:pPr marL="0" indent="0">
+              <a:lnSpc>
+                <a:spcPts val="2843"/>
+              </a:lnSpc>
+              <a:buNone/>
+            </a:pPr>
+            <a:r>
+              <a:rPr lang="en-US" sz="2187" dirty="0">
+                <a:solidFill>
+                  <a:srgbClr val="272525"/>
+                </a:solidFill>
+                <a:latin typeface="Georgia" pitchFamily="34" charset="0"/>
+                <a:ea typeface="Georgia" pitchFamily="34" charset="-122"/>
+                <a:cs typeface="Georgia" pitchFamily="34" charset="-120"/>
+              </a:rPr>
+              <a:t>ANNs have a wide range of applications</a:t>
+            </a:r>
+            <a:endParaRPr lang="en-US" sz="2187" dirty="0"/>
+          </a:p>
+        </p:txBody>
+      </p:sp>
+      <p:sp>
+        <p:nvSpPr>
+          <p:cNvPr id="12" name="Text 9"/>
+          <p:cNvSpPr/>
+          <p:nvPr/>
+        </p:nvSpPr>
+        <p:spPr>
+          <a:xfrm>
+            <a:off x="10891599" y="3132058"/>
+            <a:ext cx="2905601" cy="1599248"/>
+          </a:xfrm>
+          <a:prstGeom prst="rect">
+            <a:avLst/>
+          </a:prstGeom>
+          <a:noFill/>
+          <a:ln/>
+        </p:spPr>
+        <p:txBody>
+          <a:bodyPr wrap="square" rtlCol="0" anchor="t"/>
+          <a:lstStyle/>
+          <a:p>
+            <a:pPr marL="0" indent="0">
+              <a:lnSpc>
+                <a:spcPts val="3149"/>
+              </a:lnSpc>
+              <a:buNone/>
+            </a:pPr>
+            <a:r>
+              <a:rPr lang="en-US" sz="1750" dirty="0">
+                <a:solidFill>
+                  <a:srgbClr val="272525"/>
+                </a:solidFill>
+                <a:latin typeface="Lato" pitchFamily="34" charset="0"/>
+                <a:ea typeface="Lato" pitchFamily="34" charset="-122"/>
+                <a:cs typeface="Lato" pitchFamily="34" charset="-120"/>
+              </a:rPr>
+              <a:t>They're used in fields like image and speech recognition, natural language processing, and time series forecasting.</a:t>
+            </a:r>
+            <a:endParaRPr lang="en-US" sz="1750" dirty="0"/>
+          </a:p>
+        </p:txBody>
+      </p:sp>
+      <p:sp>
+        <p:nvSpPr>
+          <p:cNvPr id="13" name="Shape 10"/>
+          <p:cNvSpPr/>
+          <p:nvPr/>
+        </p:nvSpPr>
+        <p:spPr>
+          <a:xfrm>
+            <a:off x="6319599" y="5467231"/>
+            <a:ext cx="499943" cy="499943"/>
+          </a:xfrm>
+          <a:prstGeom prst="roundRect">
+            <a:avLst>
+              <a:gd name="adj" fmla="val 10974"/>
+            </a:avLst>
+          </a:prstGeom>
+          <a:solidFill>
+            <a:srgbClr val="E8E8E3"/>
+          </a:solidFill>
+          <a:ln w="7620">
+            <a:solidFill>
+              <a:srgbClr val="D1D1C7"/>
+            </a:solidFill>
+            <a:prstDash val="solid"/>
+          </a:ln>
+        </p:spPr>
+      </p:sp>
+      <p:sp>
+        <p:nvSpPr>
+          <p:cNvPr id="14" name="Text 11"/>
+          <p:cNvSpPr/>
+          <p:nvPr/>
+        </p:nvSpPr>
+        <p:spPr>
+          <a:xfrm>
+            <a:off x="6478072" y="5500568"/>
+            <a:ext cx="182880" cy="433149"/>
+          </a:xfrm>
+          <a:prstGeom prst="rect">
+            <a:avLst/>
+          </a:prstGeom>
+          <a:noFill/>
+          <a:ln/>
+        </p:spPr>
+        <p:txBody>
+          <a:bodyPr wrap="none" rtlCol="0" anchor="t"/>
+          <a:lstStyle/>
+          <a:p>
+            <a:pPr marL="0" indent="0" algn="ctr">
+              <a:lnSpc>
+                <a:spcPts val="3412"/>
+              </a:lnSpc>
+              <a:buNone/>
+            </a:pPr>
+            <a:r>
+              <a:rPr lang="en-US" sz="2624" dirty="0">
+                <a:solidFill>
+                  <a:srgbClr val="272525"/>
+                </a:solidFill>
+                <a:latin typeface="Georgia" pitchFamily="34" charset="0"/>
+                <a:ea typeface="Georgia" pitchFamily="34" charset="-122"/>
+                <a:cs typeface="Georgia" pitchFamily="34" charset="-120"/>
+              </a:rPr>
+              <a:t>3</a:t>
+            </a:r>
+            <a:endParaRPr lang="en-US" sz="2624" dirty="0"/>
+          </a:p>
+        </p:txBody>
+      </p:sp>
+      <p:sp>
+        <p:nvSpPr>
+          <p:cNvPr id="15" name="Text 12"/>
+          <p:cNvSpPr/>
+          <p:nvPr/>
+        </p:nvSpPr>
+        <p:spPr>
+          <a:xfrm>
+            <a:off x="7041713" y="5536644"/>
+            <a:ext cx="4091940" cy="360998"/>
+          </a:xfrm>
+          <a:prstGeom prst="rect">
+            <a:avLst/>
+          </a:prstGeom>
+          <a:noFill/>
+          <a:ln/>
+        </p:spPr>
+        <p:txBody>
+          <a:bodyPr wrap="none" rtlCol="0" anchor="t"/>
+          <a:lstStyle/>
+          <a:p>
+            <a:pPr marL="0" indent="0">
+              <a:lnSpc>
+                <a:spcPts val="2843"/>
+              </a:lnSpc>
+              <a:buNone/>
+            </a:pPr>
+            <a:r>
+              <a:rPr lang="en-US" sz="2187" dirty="0">
+                <a:solidFill>
+                  <a:srgbClr val="272525"/>
+                </a:solidFill>
+                <a:latin typeface="Georgia" pitchFamily="34" charset="0"/>
+                <a:ea typeface="Georgia" pitchFamily="34" charset="-122"/>
+                <a:cs typeface="Georgia" pitchFamily="34" charset="-120"/>
+              </a:rPr>
+              <a:t>ANNs are continually advancing</a:t>
+            </a:r>
+            <a:endParaRPr lang="en-US" sz="2187" dirty="0"/>
+          </a:p>
+        </p:txBody>
+      </p:sp>
+      <p:sp>
+        <p:nvSpPr>
+          <p:cNvPr id="16" name="Text 13"/>
+          <p:cNvSpPr/>
+          <p:nvPr/>
+        </p:nvSpPr>
+        <p:spPr>
+          <a:xfrm>
+            <a:off x="7041713" y="6119812"/>
+            <a:ext cx="6755487" cy="1199436"/>
+          </a:xfrm>
+          <a:prstGeom prst="rect">
+            <a:avLst/>
+          </a:prstGeom>
+          <a:noFill/>
+          <a:ln/>
+        </p:spPr>
+        <p:txBody>
+          <a:bodyPr wrap="square" rtlCol="0" anchor="t"/>
+          <a:lstStyle/>
+          <a:p>
+            <a:pPr marL="0" indent="0">
+              <a:lnSpc>
+                <a:spcPts val="3149"/>
+              </a:lnSpc>
+              <a:buNone/>
+            </a:pPr>
+            <a:r>
+              <a:rPr lang="en-US" sz="1750" dirty="0">
+                <a:solidFill>
+                  <a:srgbClr val="272525"/>
+                </a:solidFill>
+                <a:latin typeface="Lato" pitchFamily="34" charset="0"/>
+                <a:ea typeface="Lato" pitchFamily="34" charset="-122"/>
+                <a:cs typeface="Lato" pitchFamily="34" charset="-120"/>
+              </a:rPr>
+              <a:t>Researchers are working to improve their performance and extend their capabilities, unlocking new breakthroughs and discoveries along the way.</a:t>
+            </a:r>
+            <a:endParaRPr lang="en-US" sz="1750" dirty="0"/>
+          </a:p>
+        </p:txBody>
+      </p:sp>
+      <p:pic>
+        <p:nvPicPr>
+          <p:cNvPr id="17" name="Image 1" descr="preencoded.png"/>
+          <p:cNvPicPr>
+            <a:picLocks noChangeAspect="1"/>
+          </p:cNvPicPr>
+          <p:nvPr/>
+        </p:nvPicPr>
+        <p:blipFill>
+          <a:blip r:embed="rId4"/>
+          <a:stretch>
+            <a:fillRect/>
+          </a:stretch>
+        </p:blipFill>
+        <p:spPr>
+          <a:xfrm>
+            <a:off x="0" y="0"/>
+            <a:ext cx="5486400" cy="8229600"/>
+          </a:xfrm>
+          <a:prstGeom prst="rect">
+            <a:avLst/>
+          </a:prstGeom>
+        </p:spPr>
+      </p:pic>
+    </p:spTree>
+  </p:cSld>
+  <p:clrMapOvr>
+    <a:masterClrMapping/>
+  </p:clrMapOvr>
+</p:sld>
+</file>
+
 <file path=ppt/slides/slide2.xml><?xml version="1.0" encoding="utf-8"?>
 <p:sld xmlns:a="http://schemas.openxmlformats.org/drawingml/2006/main" xmlns:r="http://schemas.openxmlformats.org/officeDocument/2006/relationships" xmlns:p="http://schemas.openxmlformats.org/presentationml/2006/main">
   <p:cSld name="Slide 2">
@@ -8964,6 +9571,50 @@
           </a:p>
         </p:txBody>
       </p:sp>
+      <p:pic>
+        <p:nvPicPr>
+          <p:cNvPr id="4" name="Google Shape;488;p46">
+            <a:extLst>
+              <a:ext uri="{FF2B5EF4-FFF2-40B4-BE49-F238E27FC236}">
+                <a16:creationId xmlns:a16="http://schemas.microsoft.com/office/drawing/2014/main" id="{8CC25B85-25A4-79B4-B781-B3A58734DE32}"/>
+              </a:ext>
+            </a:extLst>
+          </p:cNvPr>
+          <p:cNvPicPr preferRelativeResize="0"/>
+          <p:nvPr/>
+        </p:nvPicPr>
+        <p:blipFill>
+          <a:blip r:embed="rId2">
+            <a:alphaModFix/>
+          </a:blip>
+          <a:stretch>
+            <a:fillRect/>
+          </a:stretch>
+        </p:blipFill>
+        <p:spPr>
+          <a:xfrm>
+            <a:off x="8018819" y="966167"/>
+            <a:ext cx="5020474" cy="2287350"/>
+          </a:xfrm>
+          <a:prstGeom prst="rect">
+            <a:avLst/>
+          </a:prstGeom>
+          <a:ln w="38100" cap="sq">
+            <a:solidFill>
+              <a:srgbClr val="000000"/>
+            </a:solidFill>
+            <a:prstDash val="solid"/>
+            <a:miter lim="800000"/>
+          </a:ln>
+          <a:effectLst>
+            <a:outerShdw blurRad="50800" dist="38100" dir="2700000" algn="tl" rotWithShape="0">
+              <a:srgbClr val="000000">
+                <a:alpha val="43000"/>
+              </a:srgbClr>
+            </a:outerShdw>
+          </a:effectLst>
+        </p:spPr>
+      </p:pic>
     </p:spTree>
     <p:extLst>
       <p:ext uri="{BB962C8B-B14F-4D97-AF65-F5344CB8AC3E}">
@@ -8978,6 +9629,313 @@
 </file>
 
 <file path=ppt/slides/slide5.xml><?xml version="1.0" encoding="utf-8"?>
+<p:sld xmlns:a="http://schemas.openxmlformats.org/drawingml/2006/main" xmlns:r="http://schemas.openxmlformats.org/officeDocument/2006/relationships" xmlns:p="http://schemas.openxmlformats.org/presentationml/2006/main">
+  <p:cSld>
+    <p:spTree>
+      <p:nvGrpSpPr>
+        <p:cNvPr id="1" name=""/>
+        <p:cNvGrpSpPr/>
+        <p:nvPr/>
+      </p:nvGrpSpPr>
+      <p:grpSpPr>
+        <a:xfrm>
+          <a:off x="0" y="0"/>
+          <a:ext cx="0" cy="0"/>
+          <a:chOff x="0" y="0"/>
+          <a:chExt cx="0" cy="0"/>
+        </a:xfrm>
+      </p:grpSpPr>
+      <p:sp>
+        <p:nvSpPr>
+          <p:cNvPr id="2" name="Text 1">
+            <a:extLst>
+              <a:ext uri="{FF2B5EF4-FFF2-40B4-BE49-F238E27FC236}">
+                <a16:creationId xmlns:a16="http://schemas.microsoft.com/office/drawing/2014/main" id="{F0DA6B67-2FA5-57E8-D049-85884B3FA33E}"/>
+              </a:ext>
+            </a:extLst>
+          </p:cNvPr>
+          <p:cNvSpPr/>
+          <p:nvPr/>
+        </p:nvSpPr>
+        <p:spPr>
+          <a:xfrm>
+            <a:off x="833199" y="936256"/>
+            <a:ext cx="12068762" cy="722114"/>
+          </a:xfrm>
+          <a:prstGeom prst="rect">
+            <a:avLst/>
+          </a:prstGeom>
+          <a:noFill/>
+          <a:ln/>
+        </p:spPr>
+        <p:txBody>
+          <a:bodyPr wrap="none" rtlCol="0" anchor="t"/>
+          <a:lstStyle/>
+          <a:p>
+            <a:pPr marL="0" indent="0">
+              <a:lnSpc>
+                <a:spcPts val="5686"/>
+              </a:lnSpc>
+              <a:buNone/>
+            </a:pPr>
+            <a:r>
+              <a:rPr lang="en-US" sz="4374" dirty="0">
+                <a:solidFill>
+                  <a:srgbClr val="312F2B"/>
+                </a:solidFill>
+                <a:latin typeface="Georgia" pitchFamily="34" charset="0"/>
+                <a:ea typeface="Georgia" pitchFamily="34" charset="-122"/>
+                <a:cs typeface="Georgia" pitchFamily="34" charset="-120"/>
+              </a:rPr>
+              <a:t>Activation Function RELU</a:t>
+            </a:r>
+            <a:endParaRPr lang="en-US" sz="4374" dirty="0"/>
+          </a:p>
+        </p:txBody>
+      </p:sp>
+      <p:pic>
+        <p:nvPicPr>
+          <p:cNvPr id="1026" name="Picture 2" descr="ReLU activation function. | Download Scientific Diagram">
+            <a:extLst>
+              <a:ext uri="{FF2B5EF4-FFF2-40B4-BE49-F238E27FC236}">
+                <a16:creationId xmlns:a16="http://schemas.microsoft.com/office/drawing/2014/main" id="{3AD77A71-B8A8-BC4B-CAF7-09D35493272E}"/>
+              </a:ext>
+            </a:extLst>
+          </p:cNvPr>
+          <p:cNvPicPr>
+            <a:picLocks noChangeAspect="1" noChangeArrowheads="1"/>
+          </p:cNvPicPr>
+          <p:nvPr/>
+        </p:nvPicPr>
+        <p:blipFill>
+          <a:blip r:embed="rId2">
+            <a:extLst>
+              <a:ext uri="{28A0092B-C50C-407E-A947-70E740481C1C}">
+                <a14:useLocalDpi xmlns:a14="http://schemas.microsoft.com/office/drawing/2010/main" val="0"/>
+              </a:ext>
+            </a:extLst>
+          </a:blip>
+          <a:srcRect/>
+          <a:stretch>
+            <a:fillRect/>
+          </a:stretch>
+        </p:blipFill>
+        <p:spPr bwMode="auto">
+          <a:xfrm>
+            <a:off x="1416336" y="1925211"/>
+            <a:ext cx="8499886" cy="4788269"/>
+          </a:xfrm>
+          <a:prstGeom prst="rect">
+            <a:avLst/>
+          </a:prstGeom>
+          <a:noFill/>
+          <a:extLst>
+            <a:ext uri="{909E8E84-426E-40DD-AFC4-6F175D3DCCD1}">
+              <a14:hiddenFill xmlns:a14="http://schemas.microsoft.com/office/drawing/2010/main">
+                <a:solidFill>
+                  <a:srgbClr val="FFFFFF"/>
+                </a:solidFill>
+              </a14:hiddenFill>
+            </a:ext>
+          </a:extLst>
+        </p:spPr>
+      </p:pic>
+    </p:spTree>
+    <p:extLst>
+      <p:ext uri="{BB962C8B-B14F-4D97-AF65-F5344CB8AC3E}">
+        <p14:creationId xmlns:p14="http://schemas.microsoft.com/office/powerpoint/2010/main" val="813099167"/>
+      </p:ext>
+    </p:extLst>
+  </p:cSld>
+  <p:clrMapOvr>
+    <a:masterClrMapping/>
+  </p:clrMapOvr>
+</p:sld>
+</file>
+
+<file path=ppt/slides/slide6.xml><?xml version="1.0" encoding="utf-8"?>
+<p:sld xmlns:a="http://schemas.openxmlformats.org/drawingml/2006/main" xmlns:r="http://schemas.openxmlformats.org/officeDocument/2006/relationships" xmlns:p="http://schemas.openxmlformats.org/presentationml/2006/main">
+  <p:cSld>
+    <p:spTree>
+      <p:nvGrpSpPr>
+        <p:cNvPr id="1" name=""/>
+        <p:cNvGrpSpPr/>
+        <p:nvPr/>
+      </p:nvGrpSpPr>
+      <p:grpSpPr>
+        <a:xfrm>
+          <a:off x="0" y="0"/>
+          <a:ext cx="0" cy="0"/>
+          <a:chOff x="0" y="0"/>
+          <a:chExt cx="0" cy="0"/>
+        </a:xfrm>
+      </p:grpSpPr>
+      <p:sp>
+        <p:nvSpPr>
+          <p:cNvPr id="2" name="Text 1">
+            <a:extLst>
+              <a:ext uri="{FF2B5EF4-FFF2-40B4-BE49-F238E27FC236}">
+                <a16:creationId xmlns:a16="http://schemas.microsoft.com/office/drawing/2014/main" id="{F0DA6B67-2FA5-57E8-D049-85884B3FA33E}"/>
+              </a:ext>
+            </a:extLst>
+          </p:cNvPr>
+          <p:cNvSpPr/>
+          <p:nvPr/>
+        </p:nvSpPr>
+        <p:spPr>
+          <a:xfrm>
+            <a:off x="833199" y="936256"/>
+            <a:ext cx="12068762" cy="722114"/>
+          </a:xfrm>
+          <a:prstGeom prst="rect">
+            <a:avLst/>
+          </a:prstGeom>
+          <a:noFill/>
+          <a:ln/>
+        </p:spPr>
+        <p:txBody>
+          <a:bodyPr wrap="none" rtlCol="0" anchor="t"/>
+          <a:lstStyle/>
+          <a:p>
+            <a:pPr marL="0" indent="0">
+              <a:lnSpc>
+                <a:spcPts val="5686"/>
+              </a:lnSpc>
+              <a:buNone/>
+            </a:pPr>
+            <a:r>
+              <a:rPr lang="en-US" sz="4374" dirty="0">
+                <a:solidFill>
+                  <a:srgbClr val="312F2B"/>
+                </a:solidFill>
+                <a:latin typeface="Georgia" pitchFamily="34" charset="0"/>
+                <a:ea typeface="Georgia" pitchFamily="34" charset="-122"/>
+                <a:cs typeface="Georgia" pitchFamily="34" charset="-120"/>
+              </a:rPr>
+              <a:t>Optimizer - ADAM</a:t>
+            </a:r>
+            <a:endParaRPr lang="en-US" sz="4374" dirty="0"/>
+          </a:p>
+        </p:txBody>
+      </p:sp>
+      <p:pic>
+        <p:nvPicPr>
+          <p:cNvPr id="2050" name="Picture 2" descr="Machine Learning for everybody">
+            <a:extLst>
+              <a:ext uri="{FF2B5EF4-FFF2-40B4-BE49-F238E27FC236}">
+                <a16:creationId xmlns:a16="http://schemas.microsoft.com/office/drawing/2014/main" id="{5B0876E9-9426-467F-7895-0F13771E2255}"/>
+              </a:ext>
+            </a:extLst>
+          </p:cNvPr>
+          <p:cNvPicPr>
+            <a:picLocks noChangeAspect="1" noChangeArrowheads="1"/>
+          </p:cNvPicPr>
+          <p:nvPr/>
+        </p:nvPicPr>
+        <p:blipFill>
+          <a:blip r:embed="rId2">
+            <a:extLst>
+              <a:ext uri="{28A0092B-C50C-407E-A947-70E740481C1C}">
+                <a14:useLocalDpi xmlns:a14="http://schemas.microsoft.com/office/drawing/2010/main" val="0"/>
+              </a:ext>
+            </a:extLst>
+          </a:blip>
+          <a:srcRect/>
+          <a:stretch>
+            <a:fillRect/>
+          </a:stretch>
+        </p:blipFill>
+        <p:spPr bwMode="auto">
+          <a:xfrm>
+            <a:off x="833199" y="1918010"/>
+            <a:ext cx="9947617" cy="6186720"/>
+          </a:xfrm>
+          <a:prstGeom prst="rect">
+            <a:avLst/>
+          </a:prstGeom>
+          <a:noFill/>
+          <a:extLst>
+            <a:ext uri="{909E8E84-426E-40DD-AFC4-6F175D3DCCD1}">
+              <a14:hiddenFill xmlns:a14="http://schemas.microsoft.com/office/drawing/2010/main">
+                <a:solidFill>
+                  <a:srgbClr val="FFFFFF"/>
+                </a:solidFill>
+              </a14:hiddenFill>
+            </a:ext>
+          </a:extLst>
+        </p:spPr>
+      </p:pic>
+      <p:sp>
+        <p:nvSpPr>
+          <p:cNvPr id="3" name="TextBox 2">
+            <a:extLst>
+              <a:ext uri="{FF2B5EF4-FFF2-40B4-BE49-F238E27FC236}">
+                <a16:creationId xmlns:a16="http://schemas.microsoft.com/office/drawing/2014/main" id="{5515AC1F-8E43-65DD-8C15-2A77413365C0}"/>
+              </a:ext>
+            </a:extLst>
+          </p:cNvPr>
+          <p:cNvSpPr txBox="1"/>
+          <p:nvPr/>
+        </p:nvSpPr>
+        <p:spPr>
+          <a:xfrm>
+            <a:off x="4772722" y="2542258"/>
+            <a:ext cx="3088888" cy="646331"/>
+          </a:xfrm>
+          <a:prstGeom prst="rect">
+            <a:avLst/>
+          </a:prstGeom>
+          <a:noFill/>
+        </p:spPr>
+        <p:txBody>
+          <a:bodyPr wrap="square" rtlCol="0">
+            <a:spAutoFit/>
+          </a:bodyPr>
+          <a:lstStyle/>
+          <a:p>
+            <a:pPr marL="285750" indent="-285750">
+              <a:buFontTx/>
+              <a:buChar char="-"/>
+            </a:pPr>
+            <a:r>
+              <a:rPr lang="en-IN" b="1" dirty="0">
+                <a:solidFill>
+                  <a:srgbClr val="FF0000"/>
+                </a:solidFill>
+              </a:rPr>
+              <a:t>Gradient descent /</a:t>
+            </a:r>
+          </a:p>
+          <a:p>
+            <a:pPr marL="285750" indent="-285750">
+              <a:buFontTx/>
+              <a:buChar char="-"/>
+            </a:pPr>
+            <a:r>
+              <a:rPr lang="en-IN" b="1" dirty="0">
+                <a:solidFill>
+                  <a:srgbClr val="FF0000"/>
+                </a:solidFill>
+              </a:rPr>
+              <a:t> Learning rate</a:t>
+            </a:r>
+          </a:p>
+        </p:txBody>
+      </p:sp>
+    </p:spTree>
+    <p:extLst>
+      <p:ext uri="{BB962C8B-B14F-4D97-AF65-F5344CB8AC3E}">
+        <p14:creationId xmlns:p14="http://schemas.microsoft.com/office/powerpoint/2010/main" val="3791592567"/>
+      </p:ext>
+    </p:extLst>
+  </p:cSld>
+  <p:clrMapOvr>
+    <a:masterClrMapping/>
+  </p:clrMapOvr>
+</p:sld>
+</file>
+
+<file path=ppt/slides/slide7.xml><?xml version="1.0" encoding="utf-8"?>
 <p:sld xmlns:a="http://schemas.openxmlformats.org/drawingml/2006/main" xmlns:r="http://schemas.openxmlformats.org/officeDocument/2006/relationships" xmlns:p="http://schemas.openxmlformats.org/presentationml/2006/main">
   <p:cSld name="Slide 3">
     <p:spTree>
@@ -9636,7 +10594,7 @@
 </p:sld>
 </file>
 
-<file path=ppt/slides/slide6.xml><?xml version="1.0" encoding="utf-8"?>
+<file path=ppt/slides/slide8.xml><?xml version="1.0" encoding="utf-8"?>
 <p:sld xmlns:a="http://schemas.openxmlformats.org/drawingml/2006/main" xmlns:r="http://schemas.openxmlformats.org/officeDocument/2006/relationships" xmlns:p="http://schemas.openxmlformats.org/presentationml/2006/main">
   <p:cSld name="Slide 5">
     <p:spTree>
@@ -10295,7 +11253,7 @@
 </p:sld>
 </file>
 
-<file path=ppt/slides/slide7.xml><?xml version="1.0" encoding="utf-8"?>
+<file path=ppt/slides/slide9.xml><?xml version="1.0" encoding="utf-8"?>
 <p:sld xmlns:a="http://schemas.openxmlformats.org/drawingml/2006/main" xmlns:r="http://schemas.openxmlformats.org/officeDocument/2006/relationships" xmlns:p="http://schemas.openxmlformats.org/presentationml/2006/main">
   <p:cSld name="Slide 6">
     <p:spTree>
@@ -10731,609 +11689,6 @@
           </a:p>
         </p:txBody>
       </p:sp>
-    </p:spTree>
-  </p:cSld>
-  <p:clrMapOvr>
-    <a:masterClrMapping/>
-  </p:clrMapOvr>
-</p:sld>
-</file>
-
-<file path=ppt/slides/slide8.xml><?xml version="1.0" encoding="utf-8"?>
-<p:sld xmlns:a="http://schemas.openxmlformats.org/drawingml/2006/main" xmlns:r="http://schemas.openxmlformats.org/officeDocument/2006/relationships" xmlns:p="http://schemas.openxmlformats.org/presentationml/2006/main">
-  <p:cSld name="Slide 7">
-    <p:spTree>
-      <p:nvGrpSpPr>
-        <p:cNvPr id="1" name=""/>
-        <p:cNvGrpSpPr/>
-        <p:nvPr/>
-      </p:nvGrpSpPr>
-      <p:grpSpPr>
-        <a:xfrm>
-          <a:off x="0" y="0"/>
-          <a:ext cx="0" cy="0"/>
-          <a:chOff x="0" y="0"/>
-          <a:chExt cx="0" cy="0"/>
-        </a:xfrm>
-      </p:grpSpPr>
-      <p:pic>
-        <p:nvPicPr>
-          <p:cNvPr id="2" name="Image 0" descr="preencoded.png"/>
-          <p:cNvPicPr>
-            <a:picLocks noChangeAspect="1"/>
-          </p:cNvPicPr>
-          <p:nvPr/>
-        </p:nvPicPr>
-        <p:blipFill>
-          <a:blip r:embed="rId3"/>
-          <a:stretch>
-            <a:fillRect/>
-          </a:stretch>
-        </p:blipFill>
-        <p:spPr>
-          <a:xfrm>
-            <a:off x="0" y="0"/>
-            <a:ext cx="14630400" cy="8229600"/>
-          </a:xfrm>
-          <a:prstGeom prst="rect">
-            <a:avLst/>
-          </a:prstGeom>
-        </p:spPr>
-      </p:pic>
-      <p:sp>
-        <p:nvSpPr>
-          <p:cNvPr id="3" name="Shape 0"/>
-          <p:cNvSpPr/>
-          <p:nvPr/>
-        </p:nvSpPr>
-        <p:spPr>
-          <a:xfrm>
-            <a:off x="0" y="0"/>
-            <a:ext cx="14630400" cy="8229600"/>
-          </a:xfrm>
-          <a:prstGeom prst="rect">
-            <a:avLst/>
-          </a:prstGeom>
-          <a:solidFill>
-            <a:srgbClr val="FFFFFF">
-              <a:alpha val="75000"/>
-            </a:srgbClr>
-          </a:solidFill>
-          <a:ln w="7620">
-            <a:solidFill>
-              <a:srgbClr val="FFFFFF">
-                <a:alpha val="64000"/>
-              </a:srgbClr>
-            </a:solidFill>
-            <a:prstDash val="solid"/>
-          </a:ln>
-        </p:spPr>
-      </p:sp>
-      <p:sp>
-        <p:nvSpPr>
-          <p:cNvPr id="4" name="Text 1"/>
-          <p:cNvSpPr/>
-          <p:nvPr/>
-        </p:nvSpPr>
-        <p:spPr>
-          <a:xfrm>
-            <a:off x="6319599" y="910352"/>
-            <a:ext cx="4443889" cy="722114"/>
-          </a:xfrm>
-          <a:prstGeom prst="rect">
-            <a:avLst/>
-          </a:prstGeom>
-          <a:noFill/>
-          <a:ln/>
-        </p:spPr>
-        <p:txBody>
-          <a:bodyPr wrap="none" rtlCol="0" anchor="t"/>
-          <a:lstStyle/>
-          <a:p>
-            <a:pPr marL="0" indent="0">
-              <a:lnSpc>
-                <a:spcPts val="5686"/>
-              </a:lnSpc>
-              <a:buNone/>
-            </a:pPr>
-            <a:r>
-              <a:rPr lang="en-US" sz="4374" dirty="0">
-                <a:solidFill>
-                  <a:srgbClr val="312F2B"/>
-                </a:solidFill>
-                <a:latin typeface="Georgia" pitchFamily="34" charset="0"/>
-                <a:ea typeface="Georgia" pitchFamily="34" charset="-122"/>
-                <a:cs typeface="Georgia" pitchFamily="34" charset="-120"/>
-              </a:rPr>
-              <a:t>Conclusion</a:t>
-            </a:r>
-            <a:endParaRPr lang="en-US" sz="4374" dirty="0"/>
-          </a:p>
-        </p:txBody>
-      </p:sp>
-      <p:sp>
-        <p:nvSpPr>
-          <p:cNvPr id="5" name="Shape 2"/>
-          <p:cNvSpPr/>
-          <p:nvPr/>
-        </p:nvSpPr>
-        <p:spPr>
-          <a:xfrm>
-            <a:off x="6319599" y="2118479"/>
-            <a:ext cx="499943" cy="499943"/>
-          </a:xfrm>
-          <a:prstGeom prst="roundRect">
-            <a:avLst>
-              <a:gd name="adj" fmla="val 10974"/>
-            </a:avLst>
-          </a:prstGeom>
-          <a:solidFill>
-            <a:srgbClr val="E8E8E3"/>
-          </a:solidFill>
-          <a:ln w="7620">
-            <a:solidFill>
-              <a:srgbClr val="D1D1C7"/>
-            </a:solidFill>
-            <a:prstDash val="solid"/>
-          </a:ln>
-        </p:spPr>
-      </p:sp>
-      <p:sp>
-        <p:nvSpPr>
-          <p:cNvPr id="6" name="Text 3"/>
-          <p:cNvSpPr/>
-          <p:nvPr/>
-        </p:nvSpPr>
-        <p:spPr>
-          <a:xfrm>
-            <a:off x="6478072" y="2151817"/>
-            <a:ext cx="182880" cy="433149"/>
-          </a:xfrm>
-          <a:prstGeom prst="rect">
-            <a:avLst/>
-          </a:prstGeom>
-          <a:noFill/>
-          <a:ln/>
-        </p:spPr>
-        <p:txBody>
-          <a:bodyPr wrap="none" rtlCol="0" anchor="t"/>
-          <a:lstStyle/>
-          <a:p>
-            <a:pPr marL="0" indent="0" algn="ctr">
-              <a:lnSpc>
-                <a:spcPts val="3412"/>
-              </a:lnSpc>
-              <a:buNone/>
-            </a:pPr>
-            <a:r>
-              <a:rPr lang="en-US" sz="2624" dirty="0">
-                <a:solidFill>
-                  <a:srgbClr val="272525"/>
-                </a:solidFill>
-                <a:latin typeface="Georgia" pitchFamily="34" charset="0"/>
-                <a:ea typeface="Georgia" pitchFamily="34" charset="-122"/>
-                <a:cs typeface="Georgia" pitchFamily="34" charset="-120"/>
-              </a:rPr>
-              <a:t>1</a:t>
-            </a:r>
-            <a:endParaRPr lang="en-US" sz="2624" dirty="0"/>
-          </a:p>
-        </p:txBody>
-      </p:sp>
-      <p:sp>
-        <p:nvSpPr>
-          <p:cNvPr id="7" name="Text 4"/>
-          <p:cNvSpPr/>
-          <p:nvPr/>
-        </p:nvSpPr>
-        <p:spPr>
-          <a:xfrm>
-            <a:off x="7041713" y="2187893"/>
-            <a:ext cx="2905601" cy="1082993"/>
-          </a:xfrm>
-          <a:prstGeom prst="rect">
-            <a:avLst/>
-          </a:prstGeom>
-          <a:noFill/>
-          <a:ln/>
-        </p:spPr>
-        <p:txBody>
-          <a:bodyPr wrap="square" rtlCol="0" anchor="t"/>
-          <a:lstStyle/>
-          <a:p>
-            <a:pPr marL="0" indent="0">
-              <a:lnSpc>
-                <a:spcPts val="2843"/>
-              </a:lnSpc>
-              <a:buNone/>
-            </a:pPr>
-            <a:r>
-              <a:rPr lang="en-US" sz="2187" dirty="0">
-                <a:solidFill>
-                  <a:srgbClr val="272525"/>
-                </a:solidFill>
-                <a:latin typeface="Georgia" pitchFamily="34" charset="0"/>
-                <a:ea typeface="Georgia" pitchFamily="34" charset="-122"/>
-                <a:cs typeface="Georgia" pitchFamily="34" charset="-120"/>
-              </a:rPr>
-              <a:t>ANNs are powerful machine learning tools</a:t>
-            </a:r>
-            <a:endParaRPr lang="en-US" sz="2187" dirty="0"/>
-          </a:p>
-        </p:txBody>
-      </p:sp>
-      <p:sp>
-        <p:nvSpPr>
-          <p:cNvPr id="8" name="Text 5"/>
-          <p:cNvSpPr/>
-          <p:nvPr/>
-        </p:nvSpPr>
-        <p:spPr>
-          <a:xfrm>
-            <a:off x="7041713" y="3493056"/>
-            <a:ext cx="2905601" cy="1599248"/>
-          </a:xfrm>
-          <a:prstGeom prst="rect">
-            <a:avLst/>
-          </a:prstGeom>
-          <a:noFill/>
-          <a:ln/>
-        </p:spPr>
-        <p:txBody>
-          <a:bodyPr wrap="square" rtlCol="0" anchor="t"/>
-          <a:lstStyle/>
-          <a:p>
-            <a:pPr marL="0" indent="0">
-              <a:lnSpc>
-                <a:spcPts val="3149"/>
-              </a:lnSpc>
-              <a:buNone/>
-            </a:pPr>
-            <a:r>
-              <a:rPr lang="en-US" sz="1750" dirty="0">
-                <a:solidFill>
-                  <a:srgbClr val="272525"/>
-                </a:solidFill>
-                <a:latin typeface="Lato" pitchFamily="34" charset="0"/>
-                <a:ea typeface="Lato" pitchFamily="34" charset="-122"/>
-                <a:cs typeface="Lato" pitchFamily="34" charset="-120"/>
-              </a:rPr>
-              <a:t>They're inspired by the human brain and can learn complex patterns from data to make predictions.</a:t>
-            </a:r>
-            <a:endParaRPr lang="en-US" sz="1750" dirty="0"/>
-          </a:p>
-        </p:txBody>
-      </p:sp>
-      <p:sp>
-        <p:nvSpPr>
-          <p:cNvPr id="9" name="Shape 6"/>
-          <p:cNvSpPr/>
-          <p:nvPr/>
-        </p:nvSpPr>
-        <p:spPr>
-          <a:xfrm>
-            <a:off x="10169485" y="2118479"/>
-            <a:ext cx="499943" cy="499943"/>
-          </a:xfrm>
-          <a:prstGeom prst="roundRect">
-            <a:avLst>
-              <a:gd name="adj" fmla="val 10974"/>
-            </a:avLst>
-          </a:prstGeom>
-          <a:solidFill>
-            <a:srgbClr val="E8E8E3"/>
-          </a:solidFill>
-          <a:ln w="7620">
-            <a:solidFill>
-              <a:srgbClr val="D1D1C7"/>
-            </a:solidFill>
-            <a:prstDash val="solid"/>
-          </a:ln>
-        </p:spPr>
-      </p:sp>
-      <p:sp>
-        <p:nvSpPr>
-          <p:cNvPr id="10" name="Text 7"/>
-          <p:cNvSpPr/>
-          <p:nvPr/>
-        </p:nvSpPr>
-        <p:spPr>
-          <a:xfrm>
-            <a:off x="10327958" y="2151817"/>
-            <a:ext cx="182880" cy="433149"/>
-          </a:xfrm>
-          <a:prstGeom prst="rect">
-            <a:avLst/>
-          </a:prstGeom>
-          <a:noFill/>
-          <a:ln/>
-        </p:spPr>
-        <p:txBody>
-          <a:bodyPr wrap="none" rtlCol="0" anchor="t"/>
-          <a:lstStyle/>
-          <a:p>
-            <a:pPr marL="0" indent="0" algn="ctr">
-              <a:lnSpc>
-                <a:spcPts val="3412"/>
-              </a:lnSpc>
-              <a:buNone/>
-            </a:pPr>
-            <a:r>
-              <a:rPr lang="en-US" sz="2624" dirty="0">
-                <a:solidFill>
-                  <a:srgbClr val="272525"/>
-                </a:solidFill>
-                <a:latin typeface="Georgia" pitchFamily="34" charset="0"/>
-                <a:ea typeface="Georgia" pitchFamily="34" charset="-122"/>
-                <a:cs typeface="Georgia" pitchFamily="34" charset="-120"/>
-              </a:rPr>
-              <a:t>2</a:t>
-            </a:r>
-            <a:endParaRPr lang="en-US" sz="2624" dirty="0"/>
-          </a:p>
-        </p:txBody>
-      </p:sp>
-      <p:sp>
-        <p:nvSpPr>
-          <p:cNvPr id="11" name="Text 8"/>
-          <p:cNvSpPr/>
-          <p:nvPr/>
-        </p:nvSpPr>
-        <p:spPr>
-          <a:xfrm>
-            <a:off x="10891599" y="2187893"/>
-            <a:ext cx="2905601" cy="721995"/>
-          </a:xfrm>
-          <a:prstGeom prst="rect">
-            <a:avLst/>
-          </a:prstGeom>
-          <a:noFill/>
-          <a:ln/>
-        </p:spPr>
-        <p:txBody>
-          <a:bodyPr wrap="square" rtlCol="0" anchor="t"/>
-          <a:lstStyle/>
-          <a:p>
-            <a:pPr marL="0" indent="0">
-              <a:lnSpc>
-                <a:spcPts val="2843"/>
-              </a:lnSpc>
-              <a:buNone/>
-            </a:pPr>
-            <a:r>
-              <a:rPr lang="en-US" sz="2187" dirty="0">
-                <a:solidFill>
-                  <a:srgbClr val="272525"/>
-                </a:solidFill>
-                <a:latin typeface="Georgia" pitchFamily="34" charset="0"/>
-                <a:ea typeface="Georgia" pitchFamily="34" charset="-122"/>
-                <a:cs typeface="Georgia" pitchFamily="34" charset="-120"/>
-              </a:rPr>
-              <a:t>ANNs have a wide range of applications</a:t>
-            </a:r>
-            <a:endParaRPr lang="en-US" sz="2187" dirty="0"/>
-          </a:p>
-        </p:txBody>
-      </p:sp>
-      <p:sp>
-        <p:nvSpPr>
-          <p:cNvPr id="12" name="Text 9"/>
-          <p:cNvSpPr/>
-          <p:nvPr/>
-        </p:nvSpPr>
-        <p:spPr>
-          <a:xfrm>
-            <a:off x="10891599" y="3132058"/>
-            <a:ext cx="2905601" cy="1599248"/>
-          </a:xfrm>
-          <a:prstGeom prst="rect">
-            <a:avLst/>
-          </a:prstGeom>
-          <a:noFill/>
-          <a:ln/>
-        </p:spPr>
-        <p:txBody>
-          <a:bodyPr wrap="square" rtlCol="0" anchor="t"/>
-          <a:lstStyle/>
-          <a:p>
-            <a:pPr marL="0" indent="0">
-              <a:lnSpc>
-                <a:spcPts val="3149"/>
-              </a:lnSpc>
-              <a:buNone/>
-            </a:pPr>
-            <a:r>
-              <a:rPr lang="en-US" sz="1750" dirty="0">
-                <a:solidFill>
-                  <a:srgbClr val="272525"/>
-                </a:solidFill>
-                <a:latin typeface="Lato" pitchFamily="34" charset="0"/>
-                <a:ea typeface="Lato" pitchFamily="34" charset="-122"/>
-                <a:cs typeface="Lato" pitchFamily="34" charset="-120"/>
-              </a:rPr>
-              <a:t>They're used in fields like image and speech recognition, natural language processing, and time series forecasting.</a:t>
-            </a:r>
-            <a:endParaRPr lang="en-US" sz="1750" dirty="0"/>
-          </a:p>
-        </p:txBody>
-      </p:sp>
-      <p:sp>
-        <p:nvSpPr>
-          <p:cNvPr id="13" name="Shape 10"/>
-          <p:cNvSpPr/>
-          <p:nvPr/>
-        </p:nvSpPr>
-        <p:spPr>
-          <a:xfrm>
-            <a:off x="6319599" y="5467231"/>
-            <a:ext cx="499943" cy="499943"/>
-          </a:xfrm>
-          <a:prstGeom prst="roundRect">
-            <a:avLst>
-              <a:gd name="adj" fmla="val 10974"/>
-            </a:avLst>
-          </a:prstGeom>
-          <a:solidFill>
-            <a:srgbClr val="E8E8E3"/>
-          </a:solidFill>
-          <a:ln w="7620">
-            <a:solidFill>
-              <a:srgbClr val="D1D1C7"/>
-            </a:solidFill>
-            <a:prstDash val="solid"/>
-          </a:ln>
-        </p:spPr>
-      </p:sp>
-      <p:sp>
-        <p:nvSpPr>
-          <p:cNvPr id="14" name="Text 11"/>
-          <p:cNvSpPr/>
-          <p:nvPr/>
-        </p:nvSpPr>
-        <p:spPr>
-          <a:xfrm>
-            <a:off x="6478072" y="5500568"/>
-            <a:ext cx="182880" cy="433149"/>
-          </a:xfrm>
-          <a:prstGeom prst="rect">
-            <a:avLst/>
-          </a:prstGeom>
-          <a:noFill/>
-          <a:ln/>
-        </p:spPr>
-        <p:txBody>
-          <a:bodyPr wrap="none" rtlCol="0" anchor="t"/>
-          <a:lstStyle/>
-          <a:p>
-            <a:pPr marL="0" indent="0" algn="ctr">
-              <a:lnSpc>
-                <a:spcPts val="3412"/>
-              </a:lnSpc>
-              <a:buNone/>
-            </a:pPr>
-            <a:r>
-              <a:rPr lang="en-US" sz="2624" dirty="0">
-                <a:solidFill>
-                  <a:srgbClr val="272525"/>
-                </a:solidFill>
-                <a:latin typeface="Georgia" pitchFamily="34" charset="0"/>
-                <a:ea typeface="Georgia" pitchFamily="34" charset="-122"/>
-                <a:cs typeface="Georgia" pitchFamily="34" charset="-120"/>
-              </a:rPr>
-              <a:t>3</a:t>
-            </a:r>
-            <a:endParaRPr lang="en-US" sz="2624" dirty="0"/>
-          </a:p>
-        </p:txBody>
-      </p:sp>
-      <p:sp>
-        <p:nvSpPr>
-          <p:cNvPr id="15" name="Text 12"/>
-          <p:cNvSpPr/>
-          <p:nvPr/>
-        </p:nvSpPr>
-        <p:spPr>
-          <a:xfrm>
-            <a:off x="7041713" y="5536644"/>
-            <a:ext cx="4091940" cy="360998"/>
-          </a:xfrm>
-          <a:prstGeom prst="rect">
-            <a:avLst/>
-          </a:prstGeom>
-          <a:noFill/>
-          <a:ln/>
-        </p:spPr>
-        <p:txBody>
-          <a:bodyPr wrap="none" rtlCol="0" anchor="t"/>
-          <a:lstStyle/>
-          <a:p>
-            <a:pPr marL="0" indent="0">
-              <a:lnSpc>
-                <a:spcPts val="2843"/>
-              </a:lnSpc>
-              <a:buNone/>
-            </a:pPr>
-            <a:r>
-              <a:rPr lang="en-US" sz="2187" dirty="0">
-                <a:solidFill>
-                  <a:srgbClr val="272525"/>
-                </a:solidFill>
-                <a:latin typeface="Georgia" pitchFamily="34" charset="0"/>
-                <a:ea typeface="Georgia" pitchFamily="34" charset="-122"/>
-                <a:cs typeface="Georgia" pitchFamily="34" charset="-120"/>
-              </a:rPr>
-              <a:t>ANNs are continually advancing</a:t>
-            </a:r>
-            <a:endParaRPr lang="en-US" sz="2187" dirty="0"/>
-          </a:p>
-        </p:txBody>
-      </p:sp>
-      <p:sp>
-        <p:nvSpPr>
-          <p:cNvPr id="16" name="Text 13"/>
-          <p:cNvSpPr/>
-          <p:nvPr/>
-        </p:nvSpPr>
-        <p:spPr>
-          <a:xfrm>
-            <a:off x="7041713" y="6119812"/>
-            <a:ext cx="6755487" cy="1199436"/>
-          </a:xfrm>
-          <a:prstGeom prst="rect">
-            <a:avLst/>
-          </a:prstGeom>
-          <a:noFill/>
-          <a:ln/>
-        </p:spPr>
-        <p:txBody>
-          <a:bodyPr wrap="square" rtlCol="0" anchor="t"/>
-          <a:lstStyle/>
-          <a:p>
-            <a:pPr marL="0" indent="0">
-              <a:lnSpc>
-                <a:spcPts val="3149"/>
-              </a:lnSpc>
-              <a:buNone/>
-            </a:pPr>
-            <a:r>
-              <a:rPr lang="en-US" sz="1750" dirty="0">
-                <a:solidFill>
-                  <a:srgbClr val="272525"/>
-                </a:solidFill>
-                <a:latin typeface="Lato" pitchFamily="34" charset="0"/>
-                <a:ea typeface="Lato" pitchFamily="34" charset="-122"/>
-                <a:cs typeface="Lato" pitchFamily="34" charset="-120"/>
-              </a:rPr>
-              <a:t>Researchers are working to improve their performance and extend their capabilities, unlocking new breakthroughs and discoveries along the way.</a:t>
-            </a:r>
-            <a:endParaRPr lang="en-US" sz="1750" dirty="0"/>
-          </a:p>
-        </p:txBody>
-      </p:sp>
-      <p:pic>
-        <p:nvPicPr>
-          <p:cNvPr id="17" name="Image 1" descr="preencoded.png"/>
-          <p:cNvPicPr>
-            <a:picLocks noChangeAspect="1"/>
-          </p:cNvPicPr>
-          <p:nvPr/>
-        </p:nvPicPr>
-        <p:blipFill>
-          <a:blip r:embed="rId4"/>
-          <a:stretch>
-            <a:fillRect/>
-          </a:stretch>
-        </p:blipFill>
-        <p:spPr>
-          <a:xfrm>
-            <a:off x="0" y="0"/>
-            <a:ext cx="5486400" cy="8229600"/>
-          </a:xfrm>
-          <a:prstGeom prst="rect">
-            <a:avLst/>
-          </a:prstGeom>
-        </p:spPr>
-      </p:pic>
     </p:spTree>
   </p:cSld>
   <p:clrMapOvr>

</xml_diff>